<commit_message>
Updated AngularJS Components presentation
</commit_message>
<xml_diff>
--- a/AngularJS/2. AngularJS Components.pptx
+++ b/AngularJS/2. AngularJS Components.pptx
@@ -5,10 +5,10 @@
     <p:sldMasterId id="2147483660" r:id="rId2"/>
   </p:sldMasterIdLst>
   <p:notesMasterIdLst>
-    <p:notesMasterId r:id="rId51"/>
+    <p:notesMasterId r:id="rId50"/>
   </p:notesMasterIdLst>
   <p:handoutMasterIdLst>
-    <p:handoutMasterId r:id="rId52"/>
+    <p:handoutMasterId r:id="rId51"/>
   </p:handoutMasterIdLst>
   <p:sldIdLst>
     <p:sldId id="274" r:id="rId3"/>
@@ -54,11 +54,10 @@
     <p:sldId id="464" r:id="rId43"/>
     <p:sldId id="465" r:id="rId44"/>
     <p:sldId id="466" r:id="rId45"/>
-    <p:sldId id="467" r:id="rId46"/>
-    <p:sldId id="468" r:id="rId47"/>
-    <p:sldId id="424" r:id="rId48"/>
-    <p:sldId id="419" r:id="rId49"/>
-    <p:sldId id="420" r:id="rId50"/>
+    <p:sldId id="468" r:id="rId46"/>
+    <p:sldId id="424" r:id="rId47"/>
+    <p:sldId id="419" r:id="rId48"/>
+    <p:sldId id="420" r:id="rId49"/>
   </p:sldIdLst>
   <p:sldSz cx="12188825" cy="6858000"/>
   <p:notesSz cx="6858000" cy="9144000"/>
@@ -217,7 +216,6 @@
             <p14:sldId id="464"/>
             <p14:sldId id="465"/>
             <p14:sldId id="466"/>
-            <p14:sldId id="467"/>
           </p14:sldIdLst>
         </p14:section>
         <p14:section name="Questions" id="{2C06B515-108E-45C3-B779-607003FA36A8}">
@@ -351,7 +349,7 @@
             <a:fld id="{FE5B4EDC-59C0-49C7-8ADA-5A781B329E02}" type="datetimeFigureOut">
               <a:rPr lang="en-US"/>
               <a:pPr/>
-              <a:t>15-Jun-15</a:t>
+              <a:t>16-Jun-15</a:t>
             </a:fld>
             <a:endParaRPr dirty="0"/>
           </a:p>
@@ -550,7 +548,7 @@
             <a:fld id="{F2D8D46A-B586-417D-BFBD-8C8FE0AAF762}" type="datetimeFigureOut">
               <a:rPr lang="en-US" smtClean="0"/>
               <a:pPr/>
-              <a:t>15-Jun-15</a:t>
+              <a:t>16-Jun-15</a:t>
             </a:fld>
             <a:endParaRPr lang="en-US"/>
           </a:p>
@@ -1421,7 +1419,7 @@
             <a:fld id="{3EBA5BD7-F043-4D1B-AA17-CD412FC534DE}" type="slidenum">
               <a:rPr lang="en-US" smtClean="0"/>
               <a:pPr/>
-              <a:t>46</a:t>
+              <a:t>45</a:t>
             </a:fld>
             <a:endParaRPr lang="en-US" dirty="0"/>
           </a:p>
@@ -1556,7 +1554,7 @@
             <a:fld id="{3EBA5BD7-F043-4D1B-AA17-CD412FC534DE}" type="slidenum">
               <a:rPr lang="en-US" smtClean="0"/>
               <a:pPr/>
-              <a:t>47</a:t>
+              <a:t>46</a:t>
             </a:fld>
             <a:endParaRPr lang="en-US" dirty="0"/>
           </a:p>
@@ -1691,7 +1689,7 @@
             <a:fld id="{3EBA5BD7-F043-4D1B-AA17-CD412FC534DE}" type="slidenum">
               <a:rPr lang="en-US" smtClean="0"/>
               <a:pPr/>
-              <a:t>48</a:t>
+              <a:t>47</a:t>
             </a:fld>
             <a:endParaRPr lang="en-US" dirty="0"/>
           </a:p>
@@ -2320,7 +2318,7 @@
             <a:fld id="{055373AC-9AA7-423B-BA00-BA1C74164DBD}" type="datetime1">
               <a:rPr lang="en-US" smtClean="0"/>
               <a:pPr/>
-              <a:t>15-Jun-15</a:t>
+              <a:t>16-Jun-15</a:t>
             </a:fld>
             <a:endParaRPr lang="en-US" dirty="0"/>
           </a:p>
@@ -3591,7 +3589,7 @@
             <a:fld id="{055373AC-9AA7-423B-BA00-BA1C74164DBD}" type="datetime1">
               <a:rPr lang="en-US" smtClean="0"/>
               <a:pPr/>
-              <a:t>15-Jun-15</a:t>
+              <a:t>16-Jun-15</a:t>
             </a:fld>
             <a:endParaRPr lang="en-US" dirty="0"/>
           </a:p>
@@ -7725,7 +7723,6 @@
               <a:rPr lang="en-US" sz="3000" dirty="0" smtClean="0"/>
               <a:t>Built-In Services, Creating Custom Services</a:t>
             </a:r>
-            <a:endParaRPr lang="en-US" sz="3000" dirty="0" smtClean="0"/>
           </a:p>
           <a:p>
             <a:pPr marL="446088" indent="-446088">
@@ -22411,993 +22408,6 @@
       </p:grpSpPr>
       <p:sp>
         <p:nvSpPr>
-          <p:cNvPr id="2" name="Title 1"/>
-          <p:cNvSpPr>
-            <a:spLocks noGrp="1"/>
-          </p:cNvSpPr>
-          <p:nvPr>
-            <p:ph type="title"/>
-          </p:nvPr>
-        </p:nvSpPr>
-        <p:spPr/>
-        <p:txBody>
-          <a:bodyPr>
-            <a:normAutofit/>
-          </a:bodyPr>
-          <a:lstStyle/>
-          <a:p>
-            <a:r>
-              <a:rPr lang="en-US" dirty="0" smtClean="0"/>
-              <a:t>Using </a:t>
-            </a:r>
-            <a:r>
-              <a:rPr lang="en-US" dirty="0"/>
-              <a:t>jQuery in Directives</a:t>
-            </a:r>
-            <a:endParaRPr lang="en-GB" dirty="0"/>
-          </a:p>
-        </p:txBody>
-      </p:sp>
-      <p:sp>
-        <p:nvSpPr>
-          <p:cNvPr id="5" name="Rectangle 4"/>
-          <p:cNvSpPr>
-            <a:spLocks noChangeArrowheads="1"/>
-          </p:cNvSpPr>
-          <p:nvPr/>
-        </p:nvSpPr>
-        <p:spPr bwMode="auto">
-          <a:xfrm>
-            <a:off x="1138236" y="1676400"/>
-            <a:ext cx="9909176" cy="397032"/>
-          </a:xfrm>
-          <a:prstGeom prst="rect">
-            <a:avLst/>
-          </a:prstGeom>
-          <a:solidFill>
-            <a:schemeClr val="accent5">
-              <a:lumMod val="40000"/>
-              <a:lumOff val="60000"/>
-              <a:alpha val="15000"/>
-            </a:schemeClr>
-          </a:solidFill>
-          <a:ln w="12700">
-            <a:solidFill>
-              <a:schemeClr val="accent5">
-                <a:lumMod val="60000"/>
-                <a:lumOff val="40000"/>
-              </a:schemeClr>
-            </a:solidFill>
-          </a:ln>
-        </p:spPr>
-        <p:txBody>
-          <a:bodyPr wrap="square">
-            <a:spAutoFit/>
-          </a:bodyPr>
-          <a:lstStyle>
-            <a:defPPr>
-              <a:defRPr lang="en-US"/>
-            </a:defPPr>
-            <a:lvl1pPr marL="0" algn="l" defTabSz="914400" rtl="0" eaLnBrk="1" latinLnBrk="0" hangingPunct="1">
-              <a:defRPr sz="1800" kern="1200">
-                <a:solidFill>
-                  <a:schemeClr val="tx1"/>
-                </a:solidFill>
-                <a:latin typeface="+mn-lt"/>
-                <a:ea typeface="+mn-ea"/>
-                <a:cs typeface="+mn-cs"/>
-              </a:defRPr>
-            </a:lvl1pPr>
-            <a:lvl2pPr marL="457200" algn="l" defTabSz="914400" rtl="0" eaLnBrk="1" latinLnBrk="0" hangingPunct="1">
-              <a:defRPr sz="1800" kern="1200">
-                <a:solidFill>
-                  <a:schemeClr val="tx1"/>
-                </a:solidFill>
-                <a:latin typeface="+mn-lt"/>
-                <a:ea typeface="+mn-ea"/>
-                <a:cs typeface="+mn-cs"/>
-              </a:defRPr>
-            </a:lvl2pPr>
-            <a:lvl3pPr marL="914400" algn="l" defTabSz="914400" rtl="0" eaLnBrk="1" latinLnBrk="0" hangingPunct="1">
-              <a:defRPr sz="1800" kern="1200">
-                <a:solidFill>
-                  <a:schemeClr val="tx1"/>
-                </a:solidFill>
-                <a:latin typeface="+mn-lt"/>
-                <a:ea typeface="+mn-ea"/>
-                <a:cs typeface="+mn-cs"/>
-              </a:defRPr>
-            </a:lvl3pPr>
-            <a:lvl4pPr marL="1371600" algn="l" defTabSz="914400" rtl="0" eaLnBrk="1" latinLnBrk="0" hangingPunct="1">
-              <a:defRPr sz="1800" kern="1200">
-                <a:solidFill>
-                  <a:schemeClr val="tx1"/>
-                </a:solidFill>
-                <a:latin typeface="+mn-lt"/>
-                <a:ea typeface="+mn-ea"/>
-                <a:cs typeface="+mn-cs"/>
-              </a:defRPr>
-            </a:lvl4pPr>
-            <a:lvl5pPr marL="1828800" algn="l" defTabSz="914400" rtl="0" eaLnBrk="1" latinLnBrk="0" hangingPunct="1">
-              <a:defRPr sz="1800" kern="1200">
-                <a:solidFill>
-                  <a:schemeClr val="tx1"/>
-                </a:solidFill>
-                <a:latin typeface="+mn-lt"/>
-                <a:ea typeface="+mn-ea"/>
-                <a:cs typeface="+mn-cs"/>
-              </a:defRPr>
-            </a:lvl5pPr>
-            <a:lvl6pPr marL="2286000" algn="l" defTabSz="914400" rtl="0" eaLnBrk="1" latinLnBrk="0" hangingPunct="1">
-              <a:defRPr sz="1800" kern="1200">
-                <a:solidFill>
-                  <a:schemeClr val="tx1"/>
-                </a:solidFill>
-                <a:latin typeface="+mn-lt"/>
-                <a:ea typeface="+mn-ea"/>
-                <a:cs typeface="+mn-cs"/>
-              </a:defRPr>
-            </a:lvl6pPr>
-            <a:lvl7pPr marL="2743200" algn="l" defTabSz="914400" rtl="0" eaLnBrk="1" latinLnBrk="0" hangingPunct="1">
-              <a:defRPr sz="1800" kern="1200">
-                <a:solidFill>
-                  <a:schemeClr val="tx1"/>
-                </a:solidFill>
-                <a:latin typeface="+mn-lt"/>
-                <a:ea typeface="+mn-ea"/>
-                <a:cs typeface="+mn-cs"/>
-              </a:defRPr>
-            </a:lvl7pPr>
-            <a:lvl8pPr marL="3200400" algn="l" defTabSz="914400" rtl="0" eaLnBrk="1" latinLnBrk="0" hangingPunct="1">
-              <a:defRPr sz="1800" kern="1200">
-                <a:solidFill>
-                  <a:schemeClr val="tx1"/>
-                </a:solidFill>
-                <a:latin typeface="+mn-lt"/>
-                <a:ea typeface="+mn-ea"/>
-                <a:cs typeface="+mn-cs"/>
-              </a:defRPr>
-            </a:lvl8pPr>
-            <a:lvl9pPr marL="3657600" algn="l" defTabSz="914400" rtl="0" eaLnBrk="1" latinLnBrk="0" hangingPunct="1">
-              <a:defRPr sz="1800" kern="1200">
-                <a:solidFill>
-                  <a:schemeClr val="tx1"/>
-                </a:solidFill>
-                <a:latin typeface="+mn-lt"/>
-                <a:ea typeface="+mn-ea"/>
-                <a:cs typeface="+mn-cs"/>
-              </a:defRPr>
-            </a:lvl9pPr>
-          </a:lstStyle>
-          <a:p>
-            <a:pPr eaLnBrk="0" hangingPunct="0">
-              <a:lnSpc>
-                <a:spcPct val="90000"/>
-              </a:lnSpc>
-              <a:spcBef>
-                <a:spcPts val="1200"/>
-              </a:spcBef>
-              <a:buClr>
-                <a:schemeClr val="accent5">
-                  <a:lumMod val="40000"/>
-                  <a:lumOff val="60000"/>
-                </a:schemeClr>
-              </a:buClr>
-              <a:buSzPct val="70000"/>
-              <a:defRPr/>
-            </a:pPr>
-            <a:r>
-              <a:rPr lang="en-US" sz="2200" b="1" noProof="1" smtClean="0">
-                <a:solidFill>
-                  <a:srgbClr val="FBEEDC"/>
-                </a:solidFill>
-                <a:effectLst>
-                  <a:outerShdw blurRad="38100" dist="38100" dir="2700000" algn="tl">
-                    <a:srgbClr val="000000">
-                      <a:alpha val="43137"/>
-                    </a:srgbClr>
-                  </a:outerShdw>
-                </a:effectLst>
-                <a:latin typeface="Consolas" pitchFamily="49" charset="0"/>
-                <a:cs typeface="Consolas" pitchFamily="49" charset="0"/>
-              </a:rPr>
-              <a:t>&lt;input type="text" date-picker /&gt;</a:t>
-            </a:r>
-            <a:endParaRPr lang="en-US" sz="2200" b="1" noProof="1">
-              <a:solidFill>
-                <a:srgbClr val="FBEEDC"/>
-              </a:solidFill>
-              <a:effectLst>
-                <a:outerShdw blurRad="38100" dist="38100" dir="2700000" algn="tl">
-                  <a:srgbClr val="000000">
-                    <a:alpha val="43137"/>
-                  </a:srgbClr>
-                </a:outerShdw>
-              </a:effectLst>
-              <a:latin typeface="Consolas" pitchFamily="49" charset="0"/>
-              <a:cs typeface="Consolas" pitchFamily="49" charset="0"/>
-            </a:endParaRPr>
-          </a:p>
-        </p:txBody>
-      </p:sp>
-      <p:sp>
-        <p:nvSpPr>
-          <p:cNvPr id="6" name="Rectangle 5"/>
-          <p:cNvSpPr>
-            <a:spLocks noChangeArrowheads="1"/>
-          </p:cNvSpPr>
-          <p:nvPr/>
-        </p:nvSpPr>
-        <p:spPr bwMode="auto">
-          <a:xfrm>
-            <a:off x="1138236" y="2426732"/>
-            <a:ext cx="9909176" cy="3607141"/>
-          </a:xfrm>
-          <a:prstGeom prst="rect">
-            <a:avLst/>
-          </a:prstGeom>
-          <a:solidFill>
-            <a:schemeClr val="accent5">
-              <a:lumMod val="40000"/>
-              <a:lumOff val="60000"/>
-              <a:alpha val="15000"/>
-            </a:schemeClr>
-          </a:solidFill>
-          <a:ln w="12700">
-            <a:solidFill>
-              <a:schemeClr val="accent5">
-                <a:lumMod val="60000"/>
-                <a:lumOff val="40000"/>
-              </a:schemeClr>
-            </a:solidFill>
-          </a:ln>
-        </p:spPr>
-        <p:txBody>
-          <a:bodyPr wrap="square">
-            <a:spAutoFit/>
-          </a:bodyPr>
-          <a:lstStyle>
-            <a:defPPr>
-              <a:defRPr lang="en-US"/>
-            </a:defPPr>
-            <a:lvl1pPr marL="0" algn="l" defTabSz="914400" rtl="0" eaLnBrk="1" latinLnBrk="0" hangingPunct="1">
-              <a:defRPr sz="1800" kern="1200">
-                <a:solidFill>
-                  <a:schemeClr val="tx1"/>
-                </a:solidFill>
-                <a:latin typeface="+mn-lt"/>
-                <a:ea typeface="+mn-ea"/>
-                <a:cs typeface="+mn-cs"/>
-              </a:defRPr>
-            </a:lvl1pPr>
-            <a:lvl2pPr marL="457200" algn="l" defTabSz="914400" rtl="0" eaLnBrk="1" latinLnBrk="0" hangingPunct="1">
-              <a:defRPr sz="1800" kern="1200">
-                <a:solidFill>
-                  <a:schemeClr val="tx1"/>
-                </a:solidFill>
-                <a:latin typeface="+mn-lt"/>
-                <a:ea typeface="+mn-ea"/>
-                <a:cs typeface="+mn-cs"/>
-              </a:defRPr>
-            </a:lvl2pPr>
-            <a:lvl3pPr marL="914400" algn="l" defTabSz="914400" rtl="0" eaLnBrk="1" latinLnBrk="0" hangingPunct="1">
-              <a:defRPr sz="1800" kern="1200">
-                <a:solidFill>
-                  <a:schemeClr val="tx1"/>
-                </a:solidFill>
-                <a:latin typeface="+mn-lt"/>
-                <a:ea typeface="+mn-ea"/>
-                <a:cs typeface="+mn-cs"/>
-              </a:defRPr>
-            </a:lvl3pPr>
-            <a:lvl4pPr marL="1371600" algn="l" defTabSz="914400" rtl="0" eaLnBrk="1" latinLnBrk="0" hangingPunct="1">
-              <a:defRPr sz="1800" kern="1200">
-                <a:solidFill>
-                  <a:schemeClr val="tx1"/>
-                </a:solidFill>
-                <a:latin typeface="+mn-lt"/>
-                <a:ea typeface="+mn-ea"/>
-                <a:cs typeface="+mn-cs"/>
-              </a:defRPr>
-            </a:lvl4pPr>
-            <a:lvl5pPr marL="1828800" algn="l" defTabSz="914400" rtl="0" eaLnBrk="1" latinLnBrk="0" hangingPunct="1">
-              <a:defRPr sz="1800" kern="1200">
-                <a:solidFill>
-                  <a:schemeClr val="tx1"/>
-                </a:solidFill>
-                <a:latin typeface="+mn-lt"/>
-                <a:ea typeface="+mn-ea"/>
-                <a:cs typeface="+mn-cs"/>
-              </a:defRPr>
-            </a:lvl5pPr>
-            <a:lvl6pPr marL="2286000" algn="l" defTabSz="914400" rtl="0" eaLnBrk="1" latinLnBrk="0" hangingPunct="1">
-              <a:defRPr sz="1800" kern="1200">
-                <a:solidFill>
-                  <a:schemeClr val="tx1"/>
-                </a:solidFill>
-                <a:latin typeface="+mn-lt"/>
-                <a:ea typeface="+mn-ea"/>
-                <a:cs typeface="+mn-cs"/>
-              </a:defRPr>
-            </a:lvl6pPr>
-            <a:lvl7pPr marL="2743200" algn="l" defTabSz="914400" rtl="0" eaLnBrk="1" latinLnBrk="0" hangingPunct="1">
-              <a:defRPr sz="1800" kern="1200">
-                <a:solidFill>
-                  <a:schemeClr val="tx1"/>
-                </a:solidFill>
-                <a:latin typeface="+mn-lt"/>
-                <a:ea typeface="+mn-ea"/>
-                <a:cs typeface="+mn-cs"/>
-              </a:defRPr>
-            </a:lvl7pPr>
-            <a:lvl8pPr marL="3200400" algn="l" defTabSz="914400" rtl="0" eaLnBrk="1" latinLnBrk="0" hangingPunct="1">
-              <a:defRPr sz="1800" kern="1200">
-                <a:solidFill>
-                  <a:schemeClr val="tx1"/>
-                </a:solidFill>
-                <a:latin typeface="+mn-lt"/>
-                <a:ea typeface="+mn-ea"/>
-                <a:cs typeface="+mn-cs"/>
-              </a:defRPr>
-            </a:lvl8pPr>
-            <a:lvl9pPr marL="3657600" algn="l" defTabSz="914400" rtl="0" eaLnBrk="1" latinLnBrk="0" hangingPunct="1">
-              <a:defRPr sz="1800" kern="1200">
-                <a:solidFill>
-                  <a:schemeClr val="tx1"/>
-                </a:solidFill>
-                <a:latin typeface="+mn-lt"/>
-                <a:ea typeface="+mn-ea"/>
-                <a:cs typeface="+mn-cs"/>
-              </a:defRPr>
-            </a:lvl9pPr>
-          </a:lstStyle>
-          <a:p>
-            <a:pPr eaLnBrk="0" hangingPunct="0">
-              <a:lnSpc>
-                <a:spcPct val="90000"/>
-              </a:lnSpc>
-              <a:spcBef>
-                <a:spcPts val="1200"/>
-              </a:spcBef>
-              <a:buClr>
-                <a:schemeClr val="accent5">
-                  <a:lumMod val="40000"/>
-                  <a:lumOff val="60000"/>
-                </a:schemeClr>
-              </a:buClr>
-              <a:buSzPct val="70000"/>
-              <a:defRPr/>
-            </a:pPr>
-            <a:r>
-              <a:rPr lang="en-US" sz="2200" b="1" noProof="1" smtClean="0">
-                <a:solidFill>
-                  <a:srgbClr val="FBEEDC"/>
-                </a:solidFill>
-                <a:effectLst>
-                  <a:outerShdw blurRad="38100" dist="38100" dir="2700000" algn="tl">
-                    <a:srgbClr val="000000">
-                      <a:alpha val="43137"/>
-                    </a:srgbClr>
-                  </a:outerShdw>
-                </a:effectLst>
-                <a:latin typeface="Consolas" pitchFamily="49" charset="0"/>
-                <a:cs typeface="Consolas" pitchFamily="49" charset="0"/>
-              </a:rPr>
-              <a:t>app.directive('datePicker', function() {</a:t>
-            </a:r>
-          </a:p>
-          <a:p>
-            <a:pPr eaLnBrk="0" hangingPunct="0">
-              <a:lnSpc>
-                <a:spcPct val="90000"/>
-              </a:lnSpc>
-              <a:spcBef>
-                <a:spcPts val="1200"/>
-              </a:spcBef>
-              <a:buClr>
-                <a:schemeClr val="accent5">
-                  <a:lumMod val="40000"/>
-                  <a:lumOff val="60000"/>
-                </a:schemeClr>
-              </a:buClr>
-              <a:buSzPct val="70000"/>
-              <a:defRPr/>
-            </a:pPr>
-            <a:r>
-              <a:rPr lang="en-US" sz="2200" b="1" noProof="1" smtClean="0">
-                <a:solidFill>
-                  <a:srgbClr val="FBEEDC"/>
-                </a:solidFill>
-                <a:effectLst>
-                  <a:outerShdw blurRad="38100" dist="38100" dir="2700000" algn="tl">
-                    <a:srgbClr val="000000">
-                      <a:alpha val="43137"/>
-                    </a:srgbClr>
-                  </a:outerShdw>
-                </a:effectLst>
-                <a:latin typeface="Consolas" pitchFamily="49" charset="0"/>
-                <a:cs typeface="Consolas" pitchFamily="49" charset="0"/>
-              </a:rPr>
-              <a:t>  return {</a:t>
-            </a:r>
-          </a:p>
-          <a:p>
-            <a:pPr eaLnBrk="0" hangingPunct="0">
-              <a:lnSpc>
-                <a:spcPct val="90000"/>
-              </a:lnSpc>
-              <a:spcBef>
-                <a:spcPts val="1200"/>
-              </a:spcBef>
-              <a:buClr>
-                <a:schemeClr val="accent5">
-                  <a:lumMod val="40000"/>
-                  <a:lumOff val="60000"/>
-                </a:schemeClr>
-              </a:buClr>
-              <a:buSzPct val="70000"/>
-              <a:defRPr/>
-            </a:pPr>
-            <a:r>
-              <a:rPr lang="en-US" sz="2200" b="1" noProof="1" smtClean="0">
-                <a:solidFill>
-                  <a:srgbClr val="FBEEDC"/>
-                </a:solidFill>
-                <a:effectLst>
-                  <a:outerShdw blurRad="38100" dist="38100" dir="2700000" algn="tl">
-                    <a:srgbClr val="000000">
-                      <a:alpha val="43137"/>
-                    </a:srgbClr>
-                  </a:outerShdw>
-                </a:effectLst>
-                <a:latin typeface="Consolas" pitchFamily="49" charset="0"/>
-                <a:cs typeface="Consolas" pitchFamily="49" charset="0"/>
-              </a:rPr>
-              <a:t>    restrict: 'A',</a:t>
-            </a:r>
-          </a:p>
-          <a:p>
-            <a:pPr eaLnBrk="0" hangingPunct="0">
-              <a:lnSpc>
-                <a:spcPct val="90000"/>
-              </a:lnSpc>
-              <a:spcBef>
-                <a:spcPts val="1200"/>
-              </a:spcBef>
-              <a:buClr>
-                <a:schemeClr val="accent5">
-                  <a:lumMod val="40000"/>
-                  <a:lumOff val="60000"/>
-                </a:schemeClr>
-              </a:buClr>
-              <a:buSzPct val="70000"/>
-              <a:defRPr/>
-            </a:pPr>
-            <a:r>
-              <a:rPr lang="en-US" sz="2200" b="1" noProof="1" smtClean="0">
-                <a:solidFill>
-                  <a:srgbClr val="FBEEDC"/>
-                </a:solidFill>
-                <a:effectLst>
-                  <a:outerShdw blurRad="38100" dist="38100" dir="2700000" algn="tl">
-                    <a:srgbClr val="000000">
-                      <a:alpha val="43137"/>
-                    </a:srgbClr>
-                  </a:outerShdw>
-                </a:effectLst>
-                <a:latin typeface="Consolas" pitchFamily="49" charset="0"/>
-                <a:cs typeface="Consolas" pitchFamily="49" charset="0"/>
-              </a:rPr>
-              <a:t>    link: function(scope, element) {</a:t>
-            </a:r>
-          </a:p>
-          <a:p>
-            <a:pPr eaLnBrk="0" hangingPunct="0">
-              <a:lnSpc>
-                <a:spcPct val="90000"/>
-              </a:lnSpc>
-              <a:spcBef>
-                <a:spcPts val="1200"/>
-              </a:spcBef>
-              <a:buClr>
-                <a:schemeClr val="accent5">
-                  <a:lumMod val="40000"/>
-                  <a:lumOff val="60000"/>
-                </a:schemeClr>
-              </a:buClr>
-              <a:buSzPct val="70000"/>
-              <a:defRPr/>
-            </a:pPr>
-            <a:r>
-              <a:rPr lang="en-US" sz="2200" b="1" noProof="1" smtClean="0">
-                <a:solidFill>
-                  <a:srgbClr val="FBEEDC"/>
-                </a:solidFill>
-                <a:effectLst>
-                  <a:outerShdw blurRad="38100" dist="38100" dir="2700000" algn="tl">
-                    <a:srgbClr val="000000">
-                      <a:alpha val="43137"/>
-                    </a:srgbClr>
-                  </a:outerShdw>
-                </a:effectLst>
-                <a:latin typeface="Consolas" pitchFamily="49" charset="0"/>
-                <a:cs typeface="Consolas" pitchFamily="49" charset="0"/>
-              </a:rPr>
-              <a:t>      element.datepicker();</a:t>
-            </a:r>
-            <a:endParaRPr lang="en-US" sz="2200" b="1" noProof="1">
-              <a:solidFill>
-                <a:srgbClr val="FBEEDC"/>
-              </a:solidFill>
-              <a:effectLst>
-                <a:outerShdw blurRad="38100" dist="38100" dir="2700000" algn="tl">
-                  <a:srgbClr val="000000">
-                    <a:alpha val="43137"/>
-                  </a:srgbClr>
-                </a:outerShdw>
-              </a:effectLst>
-              <a:latin typeface="Consolas" pitchFamily="49" charset="0"/>
-              <a:cs typeface="Consolas" pitchFamily="49" charset="0"/>
-            </a:endParaRPr>
-          </a:p>
-          <a:p>
-            <a:pPr eaLnBrk="0" hangingPunct="0">
-              <a:lnSpc>
-                <a:spcPct val="90000"/>
-              </a:lnSpc>
-              <a:spcBef>
-                <a:spcPts val="1200"/>
-              </a:spcBef>
-              <a:buClr>
-                <a:schemeClr val="accent5">
-                  <a:lumMod val="40000"/>
-                  <a:lumOff val="60000"/>
-                </a:schemeClr>
-              </a:buClr>
-              <a:buSzPct val="70000"/>
-              <a:defRPr/>
-            </a:pPr>
-            <a:r>
-              <a:rPr lang="en-US" sz="2200" b="1" noProof="1" smtClean="0">
-                <a:solidFill>
-                  <a:srgbClr val="FBEEDC"/>
-                </a:solidFill>
-                <a:effectLst>
-                  <a:outerShdw blurRad="38100" dist="38100" dir="2700000" algn="tl">
-                    <a:srgbClr val="000000">
-                      <a:alpha val="43137"/>
-                    </a:srgbClr>
-                  </a:outerShdw>
-                </a:effectLst>
-                <a:latin typeface="Consolas" pitchFamily="49" charset="0"/>
-                <a:cs typeface="Consolas" pitchFamily="49" charset="0"/>
-              </a:rPr>
-              <a:t>    }</a:t>
-            </a:r>
-            <a:endParaRPr lang="en-US" sz="2200" b="1" noProof="1">
-              <a:solidFill>
-                <a:srgbClr val="FBEEDC"/>
-              </a:solidFill>
-              <a:effectLst>
-                <a:outerShdw blurRad="38100" dist="38100" dir="2700000" algn="tl">
-                  <a:srgbClr val="000000">
-                    <a:alpha val="43137"/>
-                  </a:srgbClr>
-                </a:outerShdw>
-              </a:effectLst>
-              <a:latin typeface="Consolas" pitchFamily="49" charset="0"/>
-              <a:cs typeface="Consolas" pitchFamily="49" charset="0"/>
-            </a:endParaRPr>
-          </a:p>
-          <a:p>
-            <a:pPr eaLnBrk="0" hangingPunct="0">
-              <a:lnSpc>
-                <a:spcPct val="90000"/>
-              </a:lnSpc>
-              <a:spcBef>
-                <a:spcPts val="1200"/>
-              </a:spcBef>
-              <a:buClr>
-                <a:schemeClr val="accent5">
-                  <a:lumMod val="40000"/>
-                  <a:lumOff val="60000"/>
-                </a:schemeClr>
-              </a:buClr>
-              <a:buSzPct val="70000"/>
-              <a:defRPr/>
-            </a:pPr>
-            <a:r>
-              <a:rPr lang="en-US" sz="2200" b="1" noProof="1" smtClean="0">
-                <a:solidFill>
-                  <a:srgbClr val="FBEEDC"/>
-                </a:solidFill>
-                <a:effectLst>
-                  <a:outerShdw blurRad="38100" dist="38100" dir="2700000" algn="tl">
-                    <a:srgbClr val="000000">
-                      <a:alpha val="43137"/>
-                    </a:srgbClr>
-                  </a:outerShdw>
-                </a:effectLst>
-                <a:latin typeface="Consolas" pitchFamily="49" charset="0"/>
-                <a:cs typeface="Consolas" pitchFamily="49" charset="0"/>
-              </a:rPr>
-              <a:t>  }</a:t>
-            </a:r>
-            <a:endParaRPr lang="en-US" sz="2200" b="1" noProof="1">
-              <a:solidFill>
-                <a:srgbClr val="FBEEDC"/>
-              </a:solidFill>
-              <a:effectLst>
-                <a:outerShdw blurRad="38100" dist="38100" dir="2700000" algn="tl">
-                  <a:srgbClr val="000000">
-                    <a:alpha val="43137"/>
-                  </a:srgbClr>
-                </a:outerShdw>
-              </a:effectLst>
-              <a:latin typeface="Consolas" pitchFamily="49" charset="0"/>
-              <a:cs typeface="Consolas" pitchFamily="49" charset="0"/>
-            </a:endParaRPr>
-          </a:p>
-          <a:p>
-            <a:pPr eaLnBrk="0" hangingPunct="0">
-              <a:lnSpc>
-                <a:spcPct val="90000"/>
-              </a:lnSpc>
-              <a:spcBef>
-                <a:spcPts val="1200"/>
-              </a:spcBef>
-              <a:buClr>
-                <a:schemeClr val="accent5">
-                  <a:lumMod val="40000"/>
-                  <a:lumOff val="60000"/>
-                </a:schemeClr>
-              </a:buClr>
-              <a:buSzPct val="70000"/>
-              <a:defRPr/>
-            </a:pPr>
-            <a:r>
-              <a:rPr lang="en-US" sz="2200" b="1" noProof="1" smtClean="0">
-                <a:solidFill>
-                  <a:srgbClr val="FBEEDC"/>
-                </a:solidFill>
-                <a:effectLst>
-                  <a:outerShdw blurRad="38100" dist="38100" dir="2700000" algn="tl">
-                    <a:srgbClr val="000000">
-                      <a:alpha val="43137"/>
-                    </a:srgbClr>
-                  </a:outerShdw>
-                </a:effectLst>
-                <a:latin typeface="Consolas" pitchFamily="49" charset="0"/>
-                <a:cs typeface="Consolas" pitchFamily="49" charset="0"/>
-              </a:rPr>
-              <a:t>});</a:t>
-            </a:r>
-            <a:endParaRPr lang="en-US" sz="2200" b="1" noProof="1">
-              <a:solidFill>
-                <a:srgbClr val="FBEEDC"/>
-              </a:solidFill>
-              <a:effectLst>
-                <a:outerShdw blurRad="38100" dist="38100" dir="2700000" algn="tl">
-                  <a:srgbClr val="000000">
-                    <a:alpha val="43137"/>
-                  </a:srgbClr>
-                </a:outerShdw>
-              </a:effectLst>
-              <a:latin typeface="Consolas" pitchFamily="49" charset="0"/>
-              <a:cs typeface="Consolas" pitchFamily="49" charset="0"/>
-            </a:endParaRPr>
-          </a:p>
-        </p:txBody>
-      </p:sp>
-      <p:sp>
-        <p:nvSpPr>
-          <p:cNvPr id="7" name="AutoShape 7"/>
-          <p:cNvSpPr>
-            <a:spLocks noChangeArrowheads="1"/>
-          </p:cNvSpPr>
-          <p:nvPr/>
-        </p:nvSpPr>
-        <p:spPr bwMode="auto">
-          <a:xfrm>
-            <a:off x="6359456" y="4625008"/>
-            <a:ext cx="2971800" cy="997235"/>
-          </a:xfrm>
-          <a:prstGeom prst="wedgeRoundRectCallout">
-            <a:avLst>
-              <a:gd name="adj1" fmla="val -76333"/>
-              <a:gd name="adj2" fmla="val -59567"/>
-              <a:gd name="adj3" fmla="val 16667"/>
-            </a:avLst>
-          </a:prstGeom>
-          <a:solidFill>
-            <a:srgbClr val="643F07">
-              <a:alpha val="95000"/>
-            </a:srgbClr>
-          </a:solidFill>
-          <a:ln w="19050">
-            <a:solidFill>
-              <a:srgbClr val="F8D49E">
-                <a:alpha val="80000"/>
-              </a:srgbClr>
-            </a:solidFill>
-          </a:ln>
-        </p:spPr>
-        <p:style>
-          <a:lnRef idx="2">
-            <a:schemeClr val="accent1">
-              <a:shade val="50000"/>
-            </a:schemeClr>
-          </a:lnRef>
-          <a:fillRef idx="1">
-            <a:schemeClr val="accent1"/>
-          </a:fillRef>
-          <a:effectRef idx="0">
-            <a:schemeClr val="accent1"/>
-          </a:effectRef>
-          <a:fontRef idx="minor">
-            <a:schemeClr val="lt1"/>
-          </a:fontRef>
-        </p:style>
-        <p:txBody>
-          <a:bodyPr rot="0" spcFirstLastPara="0" vertOverflow="overflow" horzOverflow="overflow" vert="horz" wrap="square" lIns="91440" tIns="45720" rIns="91440" bIns="45720" numCol="1" spcCol="0" rtlCol="0" fromWordArt="0" anchor="ctr" anchorCtr="0" forceAA="0" compatLnSpc="1">
-            <a:prstTxWarp prst="textNoShape">
-              <a:avLst/>
-            </a:prstTxWarp>
-            <a:noAutofit/>
-          </a:bodyPr>
-          <a:lstStyle/>
-          <a:p>
-            <a:pPr algn="ctr" eaLnBrk="0" hangingPunct="0">
-              <a:buClr>
-                <a:schemeClr val="accent5">
-                  <a:lumMod val="40000"/>
-                  <a:lumOff val="60000"/>
-                </a:schemeClr>
-              </a:buClr>
-              <a:buSzPct val="70000"/>
-            </a:pPr>
-            <a:r>
-              <a:rPr lang="en-US" b="1" noProof="1" smtClean="0">
-                <a:solidFill>
-                  <a:srgbClr val="F7FFE7"/>
-                </a:solidFill>
-                <a:effectLst>
-                  <a:outerShdw blurRad="38100" dist="38100" dir="2700000" algn="tl">
-                    <a:srgbClr val="000000">
-                      <a:alpha val="43137"/>
-                    </a:srgbClr>
-                  </a:outerShdw>
-                </a:effectLst>
-                <a:cs typeface="Consolas" pitchFamily="49" charset="0"/>
-              </a:rPr>
-              <a:t>Add datepicker to the current element</a:t>
-            </a:r>
-            <a:endParaRPr lang="en-US" b="1" noProof="1">
-              <a:solidFill>
-                <a:srgbClr val="F7FFE7"/>
-              </a:solidFill>
-              <a:effectLst>
-                <a:outerShdw blurRad="38100" dist="38100" dir="2700000" algn="tl">
-                  <a:srgbClr val="000000">
-                    <a:alpha val="43137"/>
-                  </a:srgbClr>
-                </a:outerShdw>
-              </a:effectLst>
-              <a:cs typeface="Consolas" pitchFamily="49" charset="0"/>
-            </a:endParaRPr>
-          </a:p>
-        </p:txBody>
-      </p:sp>
-    </p:spTree>
-    <p:extLst>
-      <p:ext uri="{BB962C8B-B14F-4D97-AF65-F5344CB8AC3E}">
-        <p14:creationId xmlns:p14="http://schemas.microsoft.com/office/powerpoint/2010/main" val="2746074815"/>
-      </p:ext>
-    </p:extLst>
-  </p:cSld>
-  <p:clrMapOvr>
-    <a:masterClrMapping/>
-  </p:clrMapOvr>
-  <mc:AlternateContent xmlns:mc="http://schemas.openxmlformats.org/markup-compatibility/2006" xmlns:p14="http://schemas.microsoft.com/office/powerpoint/2010/main">
-    <mc:Choice Requires="p14">
-      <p:transition p14:dur="0"/>
-    </mc:Choice>
-    <mc:Fallback xmlns="">
-      <p:transition/>
-    </mc:Fallback>
-  </mc:AlternateContent>
-  <p:timing>
-    <p:tnLst>
-      <p:par>
-        <p:cTn id="1" dur="indefinite" restart="never" nodeType="tmRoot">
-          <p:childTnLst>
-            <p:seq concurrent="1" nextAc="seek">
-              <p:cTn id="2" dur="indefinite" nodeType="mainSeq">
-                <p:childTnLst>
-                  <p:par>
-                    <p:cTn id="3" fill="hold">
-                      <p:stCondLst>
-                        <p:cond delay="indefinite"/>
-                      </p:stCondLst>
-                      <p:childTnLst>
-                        <p:par>
-                          <p:cTn id="4" fill="hold">
-                            <p:stCondLst>
-                              <p:cond delay="0"/>
-                            </p:stCondLst>
-                            <p:childTnLst>
-                              <p:par>
-                                <p:cTn id="5" presetID="1" presetClass="entr" presetSubtype="0" fill="hold" grpId="0" nodeType="clickEffect">
-                                  <p:stCondLst>
-                                    <p:cond delay="0"/>
-                                  </p:stCondLst>
-                                  <p:childTnLst>
-                                    <p:set>
-                                      <p:cBhvr>
-                                        <p:cTn id="6" dur="1" fill="hold">
-                                          <p:stCondLst>
-                                            <p:cond delay="0"/>
-                                          </p:stCondLst>
-                                        </p:cTn>
-                                        <p:tgtEl>
-                                          <p:spTgt spid="5"/>
-                                        </p:tgtEl>
-                                        <p:attrNameLst>
-                                          <p:attrName>style.visibility</p:attrName>
-                                        </p:attrNameLst>
-                                      </p:cBhvr>
-                                      <p:to>
-                                        <p:strVal val="visible"/>
-                                      </p:to>
-                                    </p:set>
-                                  </p:childTnLst>
-                                </p:cTn>
-                              </p:par>
-                            </p:childTnLst>
-                          </p:cTn>
-                        </p:par>
-                      </p:childTnLst>
-                    </p:cTn>
-                  </p:par>
-                  <p:par>
-                    <p:cTn id="7" fill="hold">
-                      <p:stCondLst>
-                        <p:cond delay="indefinite"/>
-                      </p:stCondLst>
-                      <p:childTnLst>
-                        <p:par>
-                          <p:cTn id="8" fill="hold">
-                            <p:stCondLst>
-                              <p:cond delay="0"/>
-                            </p:stCondLst>
-                            <p:childTnLst>
-                              <p:par>
-                                <p:cTn id="9" presetID="1" presetClass="entr" presetSubtype="0" fill="hold" grpId="0" nodeType="clickEffect">
-                                  <p:stCondLst>
-                                    <p:cond delay="0"/>
-                                  </p:stCondLst>
-                                  <p:childTnLst>
-                                    <p:set>
-                                      <p:cBhvr>
-                                        <p:cTn id="10" dur="1" fill="hold">
-                                          <p:stCondLst>
-                                            <p:cond delay="0"/>
-                                          </p:stCondLst>
-                                        </p:cTn>
-                                        <p:tgtEl>
-                                          <p:spTgt spid="6"/>
-                                        </p:tgtEl>
-                                        <p:attrNameLst>
-                                          <p:attrName>style.visibility</p:attrName>
-                                        </p:attrNameLst>
-                                      </p:cBhvr>
-                                      <p:to>
-                                        <p:strVal val="visible"/>
-                                      </p:to>
-                                    </p:set>
-                                  </p:childTnLst>
-                                </p:cTn>
-                              </p:par>
-                            </p:childTnLst>
-                          </p:cTn>
-                        </p:par>
-                      </p:childTnLst>
-                    </p:cTn>
-                  </p:par>
-                  <p:par>
-                    <p:cTn id="11" fill="hold">
-                      <p:stCondLst>
-                        <p:cond delay="indefinite"/>
-                      </p:stCondLst>
-                      <p:childTnLst>
-                        <p:par>
-                          <p:cTn id="12" fill="hold">
-                            <p:stCondLst>
-                              <p:cond delay="0"/>
-                            </p:stCondLst>
-                            <p:childTnLst>
-                              <p:par>
-                                <p:cTn id="13" presetID="1" presetClass="entr" presetSubtype="0" fill="hold" grpId="0" nodeType="clickEffect">
-                                  <p:stCondLst>
-                                    <p:cond delay="0"/>
-                                  </p:stCondLst>
-                                  <p:childTnLst>
-                                    <p:set>
-                                      <p:cBhvr>
-                                        <p:cTn id="14" dur="1" fill="hold">
-                                          <p:stCondLst>
-                                            <p:cond delay="0"/>
-                                          </p:stCondLst>
-                                        </p:cTn>
-                                        <p:tgtEl>
-                                          <p:spTgt spid="7"/>
-                                        </p:tgtEl>
-                                        <p:attrNameLst>
-                                          <p:attrName>style.visibility</p:attrName>
-                                        </p:attrNameLst>
-                                      </p:cBhvr>
-                                      <p:to>
-                                        <p:strVal val="visible"/>
-                                      </p:to>
-                                    </p:set>
-                                  </p:childTnLst>
-                                </p:cTn>
-                              </p:par>
-                            </p:childTnLst>
-                          </p:cTn>
-                        </p:par>
-                      </p:childTnLst>
-                    </p:cTn>
-                  </p:par>
-                </p:childTnLst>
-              </p:cTn>
-              <p:prevCondLst>
-                <p:cond evt="onPrev" delay="0">
-                  <p:tgtEl>
-                    <p:sldTgt/>
-                  </p:tgtEl>
-                </p:cond>
-              </p:prevCondLst>
-              <p:nextCondLst>
-                <p:cond evt="onNext" delay="0">
-                  <p:tgtEl>
-                    <p:sldTgt/>
-                  </p:tgtEl>
-                </p:cond>
-              </p:nextCondLst>
-            </p:seq>
-          </p:childTnLst>
-        </p:cTn>
-      </p:par>
-    </p:tnLst>
-    <p:bldLst>
-      <p:bldP spid="5" grpId="0" animBg="1"/>
-      <p:bldP spid="6" grpId="0" animBg="1"/>
-      <p:bldP spid="7" grpId="0" animBg="1"/>
-    </p:bldLst>
-  </p:timing>
-</p:sld>
-</file>
-
-<file path=ppt/slides/slide45.xml><?xml version="1.0" encoding="utf-8"?>
-<p:sld xmlns:a="http://schemas.openxmlformats.org/drawingml/2006/main" xmlns:r="http://schemas.openxmlformats.org/officeDocument/2006/relationships" xmlns:p="http://schemas.openxmlformats.org/presentationml/2006/main">
-  <p:cSld>
-    <p:spTree>
-      <p:nvGrpSpPr>
-        <p:cNvPr id="1" name=""/>
-        <p:cNvGrpSpPr/>
-        <p:nvPr/>
-      </p:nvGrpSpPr>
-      <p:grpSpPr>
-        <a:xfrm>
-          <a:off x="0" y="0"/>
-          <a:ext cx="0" cy="0"/>
-          <a:chOff x="0" y="0"/>
-          <a:chExt cx="0" cy="0"/>
-        </a:xfrm>
-      </p:grpSpPr>
-      <p:sp>
-        <p:nvSpPr>
           <p:cNvPr id="6" name="Slide Number Placeholder 5"/>
           <p:cNvSpPr>
             <a:spLocks noGrp="1"/>
@@ -23414,7 +22424,7 @@
             <a:fld id="{C014DD1E-5D91-48A3-AD6D-45FBA980D106}" type="slidenum">
               <a:rPr lang="en-US" smtClean="0"/>
               <a:pPr/>
-              <a:t>45</a:t>
+              <a:t>44</a:t>
             </a:fld>
             <a:endParaRPr lang="en-US" dirty="0"/>
           </a:p>
@@ -24117,7 +23127,7 @@
 </p:sld>
 </file>
 
-<file path=ppt/slides/slide46.xml><?xml version="1.0" encoding="utf-8"?>
+<file path=ppt/slides/slide45.xml><?xml version="1.0" encoding="utf-8"?>
 <p:sld xmlns:a="http://schemas.openxmlformats.org/drawingml/2006/main" xmlns:r="http://schemas.openxmlformats.org/officeDocument/2006/relationships" xmlns:p="http://schemas.openxmlformats.org/presentationml/2006/main">
   <p:cSld>
     <p:spTree>
@@ -24542,7 +23552,7 @@
 </p:sld>
 </file>
 
-<file path=ppt/slides/slide47.xml><?xml version="1.0" encoding="utf-8"?>
+<file path=ppt/slides/slide46.xml><?xml version="1.0" encoding="utf-8"?>
 <p:sld xmlns:a="http://schemas.openxmlformats.org/drawingml/2006/main" xmlns:r="http://schemas.openxmlformats.org/officeDocument/2006/relationships" xmlns:p="http://schemas.openxmlformats.org/presentationml/2006/main">
   <p:cSld>
     <p:spTree>
@@ -24692,7 +23702,7 @@
             <a:fld id="{C014DD1E-5D91-48A3-AD6D-45FBA980D106}" type="slidenum">
               <a:rPr lang="en-US" smtClean="0"/>
               <a:pPr/>
-              <a:t>47</a:t>
+              <a:t>46</a:t>
             </a:fld>
             <a:endParaRPr lang="en-US" dirty="0"/>
           </a:p>
@@ -24851,7 +23861,7 @@
 </p:sld>
 </file>
 
-<file path=ppt/slides/slide48.xml><?xml version="1.0" encoding="utf-8"?>
+<file path=ppt/slides/slide47.xml><?xml version="1.0" encoding="utf-8"?>
 <p:sld xmlns:a="http://schemas.openxmlformats.org/drawingml/2006/main" xmlns:r="http://schemas.openxmlformats.org/officeDocument/2006/relationships" xmlns:p="http://schemas.openxmlformats.org/presentationml/2006/main">
   <p:cSld>
     <p:spTree>

</xml_diff>